<commit_message>
Message Brokers maju aktualizovane slajdy na 2022
</commit_message>
<xml_diff>
--- a/content/message-brokers/kopr-message-brokers.pptx
+++ b/content/message-brokers/kopr-message-brokers.pptx
@@ -5,7 +5,7 @@
     <p:sldMasterId id="2147483648" r:id="rId1"/>
   </p:sldMasterIdLst>
   <p:notesMasterIdLst>
-    <p:notesMasterId r:id="rId18"/>
+    <p:notesMasterId r:id="rId19"/>
   </p:notesMasterIdLst>
   <p:sldIdLst>
     <p:sldId id="303" r:id="rId2"/>
@@ -18,12 +18,13 @@
     <p:sldId id="381" r:id="rId9"/>
     <p:sldId id="382" r:id="rId10"/>
     <p:sldId id="384" r:id="rId11"/>
-    <p:sldId id="383" r:id="rId12"/>
-    <p:sldId id="385" r:id="rId13"/>
-    <p:sldId id="386" r:id="rId14"/>
-    <p:sldId id="387" r:id="rId15"/>
-    <p:sldId id="388" r:id="rId16"/>
-    <p:sldId id="389" r:id="rId17"/>
+    <p:sldId id="390" r:id="rId12"/>
+    <p:sldId id="383" r:id="rId13"/>
+    <p:sldId id="385" r:id="rId14"/>
+    <p:sldId id="386" r:id="rId15"/>
+    <p:sldId id="387" r:id="rId16"/>
+    <p:sldId id="388" r:id="rId17"/>
+    <p:sldId id="389" r:id="rId18"/>
   </p:sldIdLst>
   <p:sldSz cx="9144000" cy="6858000" type="screen4x3"/>
   <p:notesSz cx="6858000" cy="9144000"/>
@@ -229,7 +230,7 @@
           <a:p>
             <a:fld id="{E7E14B90-FC48-494B-ABB4-C7CAA3D3251A}" type="datetimeFigureOut">
               <a:rPr lang="sk-SK" smtClean="0"/>
-              <a:t>30.10.20</a:t>
+              <a:t>10.11.2022</a:t>
             </a:fld>
             <a:endParaRPr lang="sk-SK"/>
           </a:p>
@@ -679,7 +680,7 @@
           <a:p>
             <a:fld id="{BE6408A6-CBB4-4D3C-8C28-F46547878EE8}" type="datetimeFigureOut">
               <a:rPr lang="sk-SK" smtClean="0"/>
-              <a:t>30.10.20</a:t>
+              <a:t>10.11.2022</a:t>
             </a:fld>
             <a:endParaRPr lang="sk-SK"/>
           </a:p>
@@ -847,7 +848,7 @@
           <a:p>
             <a:fld id="{BE6408A6-CBB4-4D3C-8C28-F46547878EE8}" type="datetimeFigureOut">
               <a:rPr lang="sk-SK" smtClean="0"/>
-              <a:t>30.10.20</a:t>
+              <a:t>10.11.2022</a:t>
             </a:fld>
             <a:endParaRPr lang="sk-SK"/>
           </a:p>
@@ -1025,7 +1026,7 @@
           <a:p>
             <a:fld id="{BE6408A6-CBB4-4D3C-8C28-F46547878EE8}" type="datetimeFigureOut">
               <a:rPr lang="sk-SK" smtClean="0"/>
-              <a:t>30.10.20</a:t>
+              <a:t>10.11.2022</a:t>
             </a:fld>
             <a:endParaRPr lang="sk-SK"/>
           </a:p>
@@ -1193,7 +1194,7 @@
           <a:p>
             <a:fld id="{BE6408A6-CBB4-4D3C-8C28-F46547878EE8}" type="datetimeFigureOut">
               <a:rPr lang="sk-SK" smtClean="0"/>
-              <a:t>30.10.20</a:t>
+              <a:t>10.11.2022</a:t>
             </a:fld>
             <a:endParaRPr lang="sk-SK"/>
           </a:p>
@@ -1438,7 +1439,7 @@
           <a:p>
             <a:fld id="{BE6408A6-CBB4-4D3C-8C28-F46547878EE8}" type="datetimeFigureOut">
               <a:rPr lang="sk-SK" smtClean="0"/>
-              <a:t>30.10.20</a:t>
+              <a:t>10.11.2022</a:t>
             </a:fld>
             <a:endParaRPr lang="sk-SK"/>
           </a:p>
@@ -1723,7 +1724,7 @@
           <a:p>
             <a:fld id="{BE6408A6-CBB4-4D3C-8C28-F46547878EE8}" type="datetimeFigureOut">
               <a:rPr lang="sk-SK" smtClean="0"/>
-              <a:t>30.10.20</a:t>
+              <a:t>10.11.2022</a:t>
             </a:fld>
             <a:endParaRPr lang="sk-SK"/>
           </a:p>
@@ -2142,7 +2143,7 @@
           <a:p>
             <a:fld id="{BE6408A6-CBB4-4D3C-8C28-F46547878EE8}" type="datetimeFigureOut">
               <a:rPr lang="sk-SK" smtClean="0"/>
-              <a:t>30.10.20</a:t>
+              <a:t>10.11.2022</a:t>
             </a:fld>
             <a:endParaRPr lang="sk-SK"/>
           </a:p>
@@ -2259,7 +2260,7 @@
           <a:p>
             <a:fld id="{BE6408A6-CBB4-4D3C-8C28-F46547878EE8}" type="datetimeFigureOut">
               <a:rPr lang="sk-SK" smtClean="0"/>
-              <a:t>30.10.20</a:t>
+              <a:t>10.11.2022</a:t>
             </a:fld>
             <a:endParaRPr lang="sk-SK"/>
           </a:p>
@@ -2354,7 +2355,7 @@
           <a:p>
             <a:fld id="{BE6408A6-CBB4-4D3C-8C28-F46547878EE8}" type="datetimeFigureOut">
               <a:rPr lang="sk-SK" smtClean="0"/>
-              <a:t>30.10.20</a:t>
+              <a:t>10.11.2022</a:t>
             </a:fld>
             <a:endParaRPr lang="sk-SK"/>
           </a:p>
@@ -2629,7 +2630,7 @@
           <a:p>
             <a:fld id="{BE6408A6-CBB4-4D3C-8C28-F46547878EE8}" type="datetimeFigureOut">
               <a:rPr lang="sk-SK" smtClean="0"/>
-              <a:t>30.10.20</a:t>
+              <a:t>10.11.2022</a:t>
             </a:fld>
             <a:endParaRPr lang="sk-SK"/>
           </a:p>
@@ -2881,7 +2882,7 @@
           <a:p>
             <a:fld id="{BE6408A6-CBB4-4D3C-8C28-F46547878EE8}" type="datetimeFigureOut">
               <a:rPr lang="sk-SK" smtClean="0"/>
-              <a:t>30.10.20</a:t>
+              <a:t>10.11.2022</a:t>
             </a:fld>
             <a:endParaRPr lang="sk-SK"/>
           </a:p>
@@ -3130,7 +3131,7 @@
           <a:p>
             <a:fld id="{BE6408A6-CBB4-4D3C-8C28-F46547878EE8}" type="datetimeFigureOut">
               <a:rPr lang="sk-SK" smtClean="0"/>
-              <a:t>30.10.20</a:t>
+              <a:t>10.11.2022</a:t>
             </a:fld>
             <a:endParaRPr lang="sk-SK"/>
           </a:p>
@@ -3634,7 +3635,7 @@
             </a:br>
             <a:r>
               <a:rPr lang="sk-SK" dirty="0"/>
-              <a:t>zima 2020</a:t>
+              <a:t>zima 2022</a:t>
             </a:r>
           </a:p>
         </p:txBody>
@@ -3716,7 +3717,7 @@
         <p:spPr/>
         <p:txBody>
           <a:bodyPr>
-            <a:normAutofit fontScale="92500" lnSpcReduction="10000"/>
+            <a:normAutofit/>
           </a:bodyPr>
           <a:lstStyle/>
           <a:p>
@@ -3770,70 +3771,6 @@
             <a:r>
               <a:rPr lang="en-SK" dirty="0"/>
               <a:t> o adresátoch</a:t>
-            </a:r>
-          </a:p>
-          <a:p>
-            <a:r>
-              <a:rPr lang="en-SK" dirty="0"/>
-              <a:t>broker spravuje front (</a:t>
-            </a:r>
-            <a:r>
-              <a:rPr lang="en-SK" b="1" dirty="0">
-                <a:solidFill>
-                  <a:schemeClr val="accent6"/>
-                </a:solidFill>
-              </a:rPr>
-              <a:t>queue</a:t>
-            </a:r>
-            <a:r>
-              <a:rPr lang="en-SK" dirty="0"/>
-              <a:t>)</a:t>
-            </a:r>
-          </a:p>
-          <a:p>
-            <a:pPr lvl="1"/>
-            <a:r>
-              <a:rPr lang="en-SK" dirty="0"/>
-              <a:t>producent zapisuje do jedného konca</a:t>
-            </a:r>
-          </a:p>
-          <a:p>
-            <a:pPr lvl="1"/>
-            <a:r>
-              <a:rPr lang="en-SK" dirty="0"/>
-              <a:t>konzument(i) čítajú z opačného konca</a:t>
-            </a:r>
-          </a:p>
-          <a:p>
-            <a:r>
-              <a:rPr lang="en-SK" dirty="0"/>
-              <a:t>rieši (ne)</a:t>
-            </a:r>
-            <a:r>
-              <a:rPr lang="en-SK" b="1" dirty="0">
-                <a:solidFill>
-                  <a:schemeClr val="accent6"/>
-                </a:solidFill>
-              </a:rPr>
-              <a:t>spoľahlivosť</a:t>
-            </a:r>
-            <a:r>
-              <a:rPr lang="en-SK" dirty="0"/>
-              <a:t> doručenia</a:t>
-            </a:r>
-          </a:p>
-          <a:p>
-            <a:r>
-              <a:rPr lang="en-SK" b="1" dirty="0">
-                <a:solidFill>
-                  <a:schemeClr val="accent6"/>
-                </a:solidFill>
-              </a:rPr>
-              <a:t>perzistencia</a:t>
-            </a:r>
-            <a:r>
-              <a:rPr lang="en-SK" dirty="0"/>
-              <a:t> nedoručených správ </a:t>
             </a:r>
           </a:p>
         </p:txBody>
@@ -3891,6 +3828,152 @@
           <a:p>
             <a:r>
               <a:rPr lang="en-SK" dirty="0"/>
+              <a:t>Spoločné vlastnosti</a:t>
+            </a:r>
+          </a:p>
+        </p:txBody>
+      </p:sp>
+      <p:sp>
+        <p:nvSpPr>
+          <p:cNvPr id="3" name="Content Placeholder 2">
+            <a:extLst>
+              <a:ext uri="{FF2B5EF4-FFF2-40B4-BE49-F238E27FC236}">
+                <a16:creationId xmlns:a16="http://schemas.microsoft.com/office/drawing/2014/main" id="{0FF9ED52-217F-A64B-BB2C-5219670DA2E0}"/>
+              </a:ext>
+            </a:extLst>
+          </p:cNvPr>
+          <p:cNvSpPr>
+            <a:spLocks noGrp="1"/>
+          </p:cNvSpPr>
+          <p:nvPr>
+            <p:ph idx="1"/>
+          </p:nvPr>
+        </p:nvSpPr>
+        <p:spPr/>
+        <p:txBody>
+          <a:bodyPr>
+            <a:normAutofit/>
+          </a:bodyPr>
+          <a:lstStyle/>
+          <a:p>
+            <a:r>
+              <a:rPr lang="en-SK" dirty="0"/>
+              <a:t>broker spravuje front (</a:t>
+            </a:r>
+            <a:r>
+              <a:rPr lang="en-SK" b="1" dirty="0">
+                <a:solidFill>
+                  <a:schemeClr val="accent6"/>
+                </a:solidFill>
+              </a:rPr>
+              <a:t>queue</a:t>
+            </a:r>
+            <a:r>
+              <a:rPr lang="en-SK" dirty="0"/>
+              <a:t>)</a:t>
+            </a:r>
+          </a:p>
+          <a:p>
+            <a:pPr lvl="1"/>
+            <a:r>
+              <a:rPr lang="en-SK" dirty="0"/>
+              <a:t>producent(i) zapisujú do jedného konca</a:t>
+            </a:r>
+          </a:p>
+          <a:p>
+            <a:pPr lvl="1"/>
+            <a:r>
+              <a:rPr lang="en-SK" dirty="0"/>
+              <a:t>konzument(i) čítajú z opačného konca</a:t>
+            </a:r>
+          </a:p>
+          <a:p>
+            <a:r>
+              <a:rPr lang="en-SK" dirty="0"/>
+              <a:t>rieši (ne)</a:t>
+            </a:r>
+            <a:r>
+              <a:rPr lang="en-SK" b="1" dirty="0">
+                <a:solidFill>
+                  <a:schemeClr val="accent6"/>
+                </a:solidFill>
+              </a:rPr>
+              <a:t>spoľahlivosť</a:t>
+            </a:r>
+            <a:r>
+              <a:rPr lang="en-SK" dirty="0"/>
+              <a:t> doručenia</a:t>
+            </a:r>
+          </a:p>
+          <a:p>
+            <a:r>
+              <a:rPr lang="en-SK" b="1" dirty="0">
+                <a:solidFill>
+                  <a:schemeClr val="accent6"/>
+                </a:solidFill>
+              </a:rPr>
+              <a:t>perzistencia</a:t>
+            </a:r>
+            <a:r>
+              <a:rPr lang="en-SK" dirty="0"/>
+              <a:t> nedoručených správ </a:t>
+            </a:r>
+          </a:p>
+        </p:txBody>
+      </p:sp>
+    </p:spTree>
+    <p:extLst>
+      <p:ext uri="{BB962C8B-B14F-4D97-AF65-F5344CB8AC3E}">
+        <p14:creationId xmlns:p14="http://schemas.microsoft.com/office/powerpoint/2010/main" val="1354931308"/>
+      </p:ext>
+    </p:extLst>
+  </p:cSld>
+  <p:clrMapOvr>
+    <a:masterClrMapping/>
+  </p:clrMapOvr>
+</p:sld>
+</file>
+
+<file path=ppt/slides/slide12.xml><?xml version="1.0" encoding="utf-8"?>
+<p:sld xmlns:a="http://schemas.openxmlformats.org/drawingml/2006/main" xmlns:r="http://schemas.openxmlformats.org/officeDocument/2006/relationships" xmlns:p="http://schemas.openxmlformats.org/presentationml/2006/main">
+  <p:cSld>
+    <p:spTree>
+      <p:nvGrpSpPr>
+        <p:cNvPr id="1" name=""/>
+        <p:cNvGrpSpPr/>
+        <p:nvPr/>
+      </p:nvGrpSpPr>
+      <p:grpSpPr>
+        <a:xfrm>
+          <a:off x="0" y="0"/>
+          <a:ext cx="0" cy="0"/>
+          <a:chOff x="0" y="0"/>
+          <a:chExt cx="0" cy="0"/>
+        </a:xfrm>
+      </p:grpSpPr>
+      <p:sp>
+        <p:nvSpPr>
+          <p:cNvPr id="2" name="Title 1">
+            <a:extLst>
+              <a:ext uri="{FF2B5EF4-FFF2-40B4-BE49-F238E27FC236}">
+                <a16:creationId xmlns:a16="http://schemas.microsoft.com/office/drawing/2014/main" id="{AA021E74-A3DD-C34C-88B8-015C6799E1B4}"/>
+              </a:ext>
+            </a:extLst>
+          </p:cNvPr>
+          <p:cNvSpPr>
+            <a:spLocks noGrp="1"/>
+          </p:cNvSpPr>
+          <p:nvPr>
+            <p:ph type="title"/>
+          </p:nvPr>
+        </p:nvSpPr>
+        <p:spPr/>
+        <p:txBody>
+          <a:bodyPr/>
+          <a:lstStyle/>
+          <a:p>
+            <a:r>
+              <a:rPr lang="en-SK" dirty="0"/>
               <a:t>Architektúry: point to point</a:t>
             </a:r>
           </a:p>
@@ -3996,7 +4079,7 @@
 </p:sld>
 </file>
 
-<file path=ppt/slides/slide12.xml><?xml version="1.0" encoding="utf-8"?>
+<file path=ppt/slides/slide13.xml><?xml version="1.0" encoding="utf-8"?>
 <p:sld xmlns:a="http://schemas.openxmlformats.org/drawingml/2006/main" xmlns:r="http://schemas.openxmlformats.org/officeDocument/2006/relationships" xmlns:p="http://schemas.openxmlformats.org/presentationml/2006/main">
   <p:cSld>
     <p:spTree>
@@ -4201,151 +4284,6 @@
 </p:sld>
 </file>
 
-<file path=ppt/slides/slide13.xml><?xml version="1.0" encoding="utf-8"?>
-<p:sld xmlns:a="http://schemas.openxmlformats.org/drawingml/2006/main" xmlns:r="http://schemas.openxmlformats.org/officeDocument/2006/relationships" xmlns:p="http://schemas.openxmlformats.org/presentationml/2006/main">
-  <p:cSld>
-    <p:spTree>
-      <p:nvGrpSpPr>
-        <p:cNvPr id="1" name=""/>
-        <p:cNvGrpSpPr/>
-        <p:nvPr/>
-      </p:nvGrpSpPr>
-      <p:grpSpPr>
-        <a:xfrm>
-          <a:off x="0" y="0"/>
-          <a:ext cx="0" cy="0"/>
-          <a:chOff x="0" y="0"/>
-          <a:chExt cx="0" cy="0"/>
-        </a:xfrm>
-      </p:grpSpPr>
-      <p:sp>
-        <p:nvSpPr>
-          <p:cNvPr id="2" name="Title 1">
-            <a:extLst>
-              <a:ext uri="{FF2B5EF4-FFF2-40B4-BE49-F238E27FC236}">
-                <a16:creationId xmlns:a16="http://schemas.microsoft.com/office/drawing/2014/main" id="{AA021E74-A3DD-C34C-88B8-015C6799E1B4}"/>
-              </a:ext>
-            </a:extLst>
-          </p:cNvPr>
-          <p:cNvSpPr>
-            <a:spLocks noGrp="1"/>
-          </p:cNvSpPr>
-          <p:nvPr>
-            <p:ph type="title"/>
-          </p:nvPr>
-        </p:nvSpPr>
-        <p:spPr>
-          <a:xfrm>
-            <a:off x="457200" y="274638"/>
-            <a:ext cx="8229600" cy="1143000"/>
-          </a:xfrm>
-        </p:spPr>
-        <p:txBody>
-          <a:bodyPr/>
-          <a:lstStyle/>
-          <a:p>
-            <a:r>
-              <a:rPr lang="en-SK" dirty="0"/>
-              <a:t>Architektúry: komplexné</a:t>
-            </a:r>
-          </a:p>
-        </p:txBody>
-      </p:sp>
-      <p:sp>
-        <p:nvSpPr>
-          <p:cNvPr id="3" name="Content Placeholder 2">
-            <a:extLst>
-              <a:ext uri="{FF2B5EF4-FFF2-40B4-BE49-F238E27FC236}">
-                <a16:creationId xmlns:a16="http://schemas.microsoft.com/office/drawing/2014/main" id="{0FF9ED52-217F-A64B-BB2C-5219670DA2E0}"/>
-              </a:ext>
-            </a:extLst>
-          </p:cNvPr>
-          <p:cNvSpPr>
-            <a:spLocks noGrp="1"/>
-          </p:cNvSpPr>
-          <p:nvPr>
-            <p:ph idx="1"/>
-          </p:nvPr>
-        </p:nvSpPr>
-        <p:spPr>
-          <a:xfrm>
-            <a:off x="457200" y="1600200"/>
-            <a:ext cx="8229600" cy="4525963"/>
-          </a:xfrm>
-        </p:spPr>
-        <p:txBody>
-          <a:bodyPr>
-            <a:normAutofit/>
-          </a:bodyPr>
-          <a:lstStyle/>
-          <a:p>
-            <a:r>
-              <a:rPr lang="en-SK" b="1" dirty="0"/>
-              <a:t>queue</a:t>
-            </a:r>
-            <a:r>
-              <a:rPr lang="en-SK" dirty="0"/>
-              <a:t> je základ každého brokera</a:t>
-            </a:r>
-          </a:p>
-          <a:p>
-            <a:r>
-              <a:rPr lang="en-SK" dirty="0"/>
-              <a:t>brokeri poskytujú vlastné varianty</a:t>
-            </a:r>
-          </a:p>
-          <a:p>
-            <a:pPr lvl="1"/>
-            <a:r>
-              <a:rPr lang="en-SK" b="1" dirty="0">
-                <a:solidFill>
-                  <a:schemeClr val="accent6"/>
-                </a:solidFill>
-              </a:rPr>
-              <a:t>RabbitMQ</a:t>
-            </a:r>
-            <a:r>
-              <a:rPr lang="en-SK" dirty="0"/>
-              <a:t>: pouličné schránky -&gt; úrady -&gt; bytové schránky</a:t>
-            </a:r>
-          </a:p>
-          <a:p>
-            <a:pPr lvl="1"/>
-            <a:r>
-              <a:rPr lang="en-SK" b="1" dirty="0">
-                <a:solidFill>
-                  <a:schemeClr val="accent6"/>
-                </a:solidFill>
-              </a:rPr>
-              <a:t>Kafka</a:t>
-            </a:r>
-            <a:r>
-              <a:rPr lang="en-SK" dirty="0"/>
-              <a:t>: topic</a:t>
-            </a:r>
-            <a:r>
-              <a:rPr lang="en-SK" dirty="0">
-                <a:sym typeface="Wingdings" pitchFamily="2" charset="2"/>
-              </a:rPr>
-              <a:t> -&gt; partícia -&gt; črieda konzumentov</a:t>
-            </a:r>
-            <a:endParaRPr lang="en-SK" dirty="0"/>
-          </a:p>
-        </p:txBody>
-      </p:sp>
-    </p:spTree>
-    <p:extLst>
-      <p:ext uri="{BB962C8B-B14F-4D97-AF65-F5344CB8AC3E}">
-        <p14:creationId xmlns:p14="http://schemas.microsoft.com/office/powerpoint/2010/main" val="1979872070"/>
-      </p:ext>
-    </p:extLst>
-  </p:cSld>
-  <p:clrMapOvr>
-    <a:masterClrMapping/>
-  </p:clrMapOvr>
-</p:sld>
-</file>
-
 <file path=ppt/slides/slide14.xml><?xml version="1.0" encoding="utf-8"?>
 <p:sld xmlns:a="http://schemas.openxmlformats.org/drawingml/2006/main" xmlns:r="http://schemas.openxmlformats.org/officeDocument/2006/relationships" xmlns:p="http://schemas.openxmlformats.org/presentationml/2006/main">
   <p:cSld>
@@ -4368,7 +4306,7 @@
           <p:cNvPr id="2" name="Title 1">
             <a:extLst>
               <a:ext uri="{FF2B5EF4-FFF2-40B4-BE49-F238E27FC236}">
-                <a16:creationId xmlns:a16="http://schemas.microsoft.com/office/drawing/2014/main" id="{C03D1343-7D50-524B-B3CD-23F5787704F2}"/>
+                <a16:creationId xmlns:a16="http://schemas.microsoft.com/office/drawing/2014/main" id="{AA021E74-A3DD-C34C-88B8-015C6799E1B4}"/>
               </a:ext>
             </a:extLst>
           </p:cNvPr>
@@ -4379,14 +4317,19 @@
             <p:ph type="title"/>
           </p:nvPr>
         </p:nvSpPr>
-        <p:spPr/>
+        <p:spPr>
+          <a:xfrm>
+            <a:off x="457200" y="274638"/>
+            <a:ext cx="8229600" cy="1143000"/>
+          </a:xfrm>
+        </p:spPr>
         <p:txBody>
           <a:bodyPr/>
           <a:lstStyle/>
           <a:p>
             <a:r>
               <a:rPr lang="en-SK" dirty="0"/>
-              <a:t>Formáty správ</a:t>
+              <a:t>Architektúry: komplexné</a:t>
             </a:r>
           </a:p>
         </p:txBody>
@@ -4396,7 +4339,7 @@
           <p:cNvPr id="3" name="Content Placeholder 2">
             <a:extLst>
               <a:ext uri="{FF2B5EF4-FFF2-40B4-BE49-F238E27FC236}">
-                <a16:creationId xmlns:a16="http://schemas.microsoft.com/office/drawing/2014/main" id="{935AF7F1-44E1-A242-A1ED-B524E88DC0EB}"/>
+                <a16:creationId xmlns:a16="http://schemas.microsoft.com/office/drawing/2014/main" id="{0FF9ED52-217F-A64B-BB2C-5219670DA2E0}"/>
               </a:ext>
             </a:extLst>
           </p:cNvPr>
@@ -4407,42 +4350,84 @@
             <p:ph idx="1"/>
           </p:nvPr>
         </p:nvSpPr>
-        <p:spPr/>
-        <p:txBody>
-          <a:bodyPr/>
-          <a:lstStyle/>
-          <a:p>
-            <a:r>
-              <a:rPr lang="en-SK" dirty="0"/>
-              <a:t>binárny protokol?</a:t>
+        <p:spPr>
+          <a:xfrm>
+            <a:off x="457200" y="1600200"/>
+            <a:ext cx="8229600" cy="4525963"/>
+          </a:xfrm>
+        </p:spPr>
+        <p:txBody>
+          <a:bodyPr>
+            <a:normAutofit/>
+          </a:bodyPr>
+          <a:lstStyle/>
+          <a:p>
+            <a:r>
+              <a:rPr lang="en-SK" b="1" dirty="0"/>
+              <a:t>queue</a:t>
+            </a:r>
+            <a:r>
+              <a:rPr lang="en-SK" dirty="0"/>
+              <a:t> je základ každého brokera</a:t>
+            </a:r>
+          </a:p>
+          <a:p>
+            <a:r>
+              <a:rPr lang="en-SK" dirty="0"/>
+              <a:t>brokeri poskytujú vlastné varianty</a:t>
             </a:r>
           </a:p>
           <a:p>
             <a:pPr lvl="1"/>
             <a:r>
-              <a:rPr lang="en-SK" dirty="0"/>
-              <a:t>vlastný / Avro / Protobuf / Java serializácia</a:t>
-            </a:r>
-          </a:p>
-          <a:p>
-            <a:r>
-              <a:rPr lang="en-SK" dirty="0"/>
-              <a:t>textový protokol</a:t>
+              <a:rPr lang="en-SK" b="1" dirty="0">
+                <a:solidFill>
+                  <a:schemeClr val="accent6"/>
+                </a:solidFill>
+              </a:rPr>
+              <a:t>RabbitMQ</a:t>
+            </a:r>
+            <a:r>
+              <a:rPr lang="en-SK" dirty="0"/>
+              <a:t>: pouličné schránky -&gt; </a:t>
+            </a:r>
+            <a:r>
+              <a:rPr lang="en-SK"/>
+              <a:t>poštové pobočky </a:t>
+            </a:r>
+            <a:r>
+              <a:rPr lang="en-SK" dirty="0"/>
+              <a:t>-&gt; bytové schránky</a:t>
             </a:r>
           </a:p>
           <a:p>
             <a:pPr lvl="1"/>
             <a:r>
-              <a:rPr lang="en-SK" dirty="0"/>
-              <a:t>XML / JSON / STOMP</a:t>
-            </a:r>
+              <a:rPr lang="en-SK" b="1" dirty="0">
+                <a:solidFill>
+                  <a:schemeClr val="accent6"/>
+                </a:solidFill>
+              </a:rPr>
+              <a:t>Kafka</a:t>
+            </a:r>
+            <a:r>
+              <a:rPr lang="en-SK" dirty="0"/>
+              <a:t>: topic</a:t>
+            </a:r>
+            <a:r>
+              <a:rPr lang="en-SK" dirty="0">
+                <a:sym typeface="Wingdings" pitchFamily="2" charset="2"/>
+              </a:rPr>
+              <a:t> -&gt; partícia -&gt; črieda konzumentov</a:t>
+            </a:r>
+            <a:endParaRPr lang="en-SK" dirty="0"/>
           </a:p>
         </p:txBody>
       </p:sp>
     </p:spTree>
     <p:extLst>
       <p:ext uri="{BB962C8B-B14F-4D97-AF65-F5344CB8AC3E}">
-        <p14:creationId xmlns:p14="http://schemas.microsoft.com/office/powerpoint/2010/main" val="3811605129"/>
+        <p14:creationId xmlns:p14="http://schemas.microsoft.com/office/powerpoint/2010/main" val="1979872070"/>
       </p:ext>
     </p:extLst>
   </p:cSld>
@@ -4492,6 +4477,112 @@
           <a:p>
             <a:r>
               <a:rPr lang="en-SK" dirty="0"/>
+              <a:t>Formáty správ</a:t>
+            </a:r>
+          </a:p>
+        </p:txBody>
+      </p:sp>
+      <p:sp>
+        <p:nvSpPr>
+          <p:cNvPr id="3" name="Content Placeholder 2">
+            <a:extLst>
+              <a:ext uri="{FF2B5EF4-FFF2-40B4-BE49-F238E27FC236}">
+                <a16:creationId xmlns:a16="http://schemas.microsoft.com/office/drawing/2014/main" id="{935AF7F1-44E1-A242-A1ED-B524E88DC0EB}"/>
+              </a:ext>
+            </a:extLst>
+          </p:cNvPr>
+          <p:cNvSpPr>
+            <a:spLocks noGrp="1"/>
+          </p:cNvSpPr>
+          <p:nvPr>
+            <p:ph idx="1"/>
+          </p:nvPr>
+        </p:nvSpPr>
+        <p:spPr/>
+        <p:txBody>
+          <a:bodyPr/>
+          <a:lstStyle/>
+          <a:p>
+            <a:r>
+              <a:rPr lang="en-SK" dirty="0"/>
+              <a:t>binárny protokol?</a:t>
+            </a:r>
+          </a:p>
+          <a:p>
+            <a:pPr lvl="1"/>
+            <a:r>
+              <a:rPr lang="en-SK" dirty="0"/>
+              <a:t>vlastný / Avro / Protobuf / Java serializácia</a:t>
+            </a:r>
+          </a:p>
+          <a:p>
+            <a:r>
+              <a:rPr lang="en-SK" dirty="0"/>
+              <a:t>textový protokol</a:t>
+            </a:r>
+          </a:p>
+          <a:p>
+            <a:pPr lvl="1"/>
+            <a:r>
+              <a:rPr lang="en-SK" dirty="0"/>
+              <a:t>XML / JSON / STOMP</a:t>
+            </a:r>
+          </a:p>
+        </p:txBody>
+      </p:sp>
+    </p:spTree>
+    <p:extLst>
+      <p:ext uri="{BB962C8B-B14F-4D97-AF65-F5344CB8AC3E}">
+        <p14:creationId xmlns:p14="http://schemas.microsoft.com/office/powerpoint/2010/main" val="3811605129"/>
+      </p:ext>
+    </p:extLst>
+  </p:cSld>
+  <p:clrMapOvr>
+    <a:masterClrMapping/>
+  </p:clrMapOvr>
+</p:sld>
+</file>
+
+<file path=ppt/slides/slide16.xml><?xml version="1.0" encoding="utf-8"?>
+<p:sld xmlns:a="http://schemas.openxmlformats.org/drawingml/2006/main" xmlns:r="http://schemas.openxmlformats.org/officeDocument/2006/relationships" xmlns:p="http://schemas.openxmlformats.org/presentationml/2006/main">
+  <p:cSld>
+    <p:spTree>
+      <p:nvGrpSpPr>
+        <p:cNvPr id="1" name=""/>
+        <p:cNvGrpSpPr/>
+        <p:nvPr/>
+      </p:nvGrpSpPr>
+      <p:grpSpPr>
+        <a:xfrm>
+          <a:off x="0" y="0"/>
+          <a:ext cx="0" cy="0"/>
+          <a:chOff x="0" y="0"/>
+          <a:chExt cx="0" cy="0"/>
+        </a:xfrm>
+      </p:grpSpPr>
+      <p:sp>
+        <p:nvSpPr>
+          <p:cNvPr id="2" name="Title 1">
+            <a:extLst>
+              <a:ext uri="{FF2B5EF4-FFF2-40B4-BE49-F238E27FC236}">
+                <a16:creationId xmlns:a16="http://schemas.microsoft.com/office/drawing/2014/main" id="{C03D1343-7D50-524B-B3CD-23F5787704F2}"/>
+              </a:ext>
+            </a:extLst>
+          </p:cNvPr>
+          <p:cNvSpPr>
+            <a:spLocks noGrp="1"/>
+          </p:cNvSpPr>
+          <p:nvPr>
+            <p:ph type="title"/>
+          </p:nvPr>
+        </p:nvSpPr>
+        <p:spPr/>
+        <p:txBody>
+          <a:bodyPr/>
+          <a:lstStyle/>
+          <a:p>
+            <a:r>
+              <a:rPr lang="en-SK" dirty="0"/>
               <a:t>Spoľahlivosť doručenia</a:t>
             </a:r>
           </a:p>
@@ -4590,7 +4681,7 @@
 </p:sld>
 </file>
 
-<file path=ppt/slides/slide16.xml><?xml version="1.0" encoding="utf-8"?>
+<file path=ppt/slides/slide17.xml><?xml version="1.0" encoding="utf-8"?>
 <p:sld xmlns:a="http://schemas.openxmlformats.org/drawingml/2006/main" xmlns:r="http://schemas.openxmlformats.org/officeDocument/2006/relationships" xmlns:p="http://schemas.openxmlformats.org/presentationml/2006/main">
   <p:cSld>
     <p:spTree>

</xml_diff>